<commit_message>
update openAI chunk function
</commit_message>
<xml_diff>
--- a/server/uploads/SmartSlideGen.pptx
+++ b/server/uploads/SmartSlideGen.pptx
@@ -10,7 +10,6 @@
     <p:sldId id="258" r:id="rId9"/>
     <p:sldId id="259" r:id="rId10"/>
     <p:sldId id="260" r:id="rId11"/>
-    <p:sldId id="261" r:id="rId12"/>
   </p:sldIdLst>
   <p:sldSz cx="9144000" cy="6858000" type="screen4x3"/>
   <p:notesSz cx="6858000" cy="9144000"/>
@@ -3124,7 +3123,7 @@
               </a:defRPr>
             </a:pPr>
             <a:r>
-              <a:t>Develop AI-Driven Pipeline</a:t>
+              <a:t>AI-driven Pipeline for Word to PowerPoint Conversion</a:t>
             </a:r>
           </a:p>
         </p:txBody>
@@ -3183,6 +3182,42 @@
                 </a:solidFill>
               </a:defRPr>
             </a:pPr>
+          </a:p>
+          <a:p>
+            <a:pPr>
+              <a:defRPr>
+                <a:solidFill>
+                  <a:srgbClr val="000000"/>
+                </a:solidFill>
+              </a:defRPr>
+            </a:pPr>
+            <a:r>
+              <a:t>Develop AI-driven pipeline for conversion</a:t>
+            </a:r>
+          </a:p>
+          <a:p>
+            <a:pPr>
+              <a:defRPr>
+                <a:solidFill>
+                  <a:srgbClr val="000000"/>
+                </a:solidFill>
+              </a:defRPr>
+            </a:pPr>
+            <a:r>
+              <a:t>Parse and extract text content for initial slides</a:t>
+            </a:r>
+          </a:p>
+          <a:p>
+            <a:pPr>
+              <a:defRPr>
+                <a:solidFill>
+                  <a:srgbClr val="000000"/>
+                </a:solidFill>
+              </a:defRPr>
+            </a:pPr>
+            <a:r>
+              <a:t>Identify and extract relevant figures</a:t>
+            </a:r>
           </a:p>
         </p:txBody>
       </p:sp>
@@ -3235,7 +3270,7 @@
               </a:defRPr>
             </a:pPr>
             <a:r>
-              <a:t>Learn Key Objectives</a:t>
+              <a:t>Generative AI Techniques for Visual Explanation</a:t>
             </a:r>
           </a:p>
         </p:txBody>
@@ -3294,6 +3329,42 @@
                 </a:solidFill>
               </a:defRPr>
             </a:pPr>
+          </a:p>
+          <a:p>
+            <a:pPr>
+              <a:defRPr>
+                <a:solidFill>
+                  <a:srgbClr val="000000"/>
+                </a:solidFill>
+              </a:defRPr>
+            </a:pPr>
+            <a:r>
+              <a:t>Use generative AI for better visual explanation</a:t>
+            </a:r>
+          </a:p>
+          <a:p>
+            <a:pPr>
+              <a:defRPr>
+                <a:solidFill>
+                  <a:srgbClr val="000000"/>
+                </a:solidFill>
+              </a:defRPr>
+            </a:pPr>
+            <a:r>
+              <a:t>Create new figures for text content</a:t>
+            </a:r>
+          </a:p>
+          <a:p>
+            <a:pPr>
+              <a:defRPr>
+                <a:solidFill>
+                  <a:srgbClr val="000000"/>
+                </a:solidFill>
+              </a:defRPr>
+            </a:pPr>
+            <a:r>
+              <a:t>Utilize generative AI for text-to-image generation</a:t>
+            </a:r>
           </a:p>
         </p:txBody>
       </p:sp>
@@ -3346,7 +3417,7 @@
               </a:defRPr>
             </a:pPr>
             <a:r>
-              <a:t>Execute Project Components</a:t>
+              <a:t>Consistent Design and Color Theme</a:t>
             </a:r>
           </a:p>
         </p:txBody>
@@ -3405,6 +3476,42 @@
                 </a:solidFill>
               </a:defRPr>
             </a:pPr>
+          </a:p>
+          <a:p>
+            <a:pPr>
+              <a:defRPr>
+                <a:solidFill>
+                  <a:srgbClr val="000000"/>
+                </a:solidFill>
+              </a:defRPr>
+            </a:pPr>
+            <a:r>
+              <a:t>Apply coherent design and color theme</a:t>
+            </a:r>
+          </a:p>
+          <a:p>
+            <a:pPr>
+              <a:defRPr>
+                <a:solidFill>
+                  <a:srgbClr val="000000"/>
+                </a:solidFill>
+              </a:defRPr>
+            </a:pPr>
+            <a:r>
+              <a:t>Enforce color theme consistency</a:t>
+            </a:r>
+          </a:p>
+          <a:p>
+            <a:pPr>
+              <a:defRPr>
+                <a:solidFill>
+                  <a:srgbClr val="000000"/>
+                </a:solidFill>
+              </a:defRPr>
+            </a:pPr>
+            <a:r>
+              <a:t>Maintain consistency in font sizes</a:t>
+            </a:r>
           </a:p>
         </p:txBody>
       </p:sp>
@@ -3457,7 +3564,7 @@
               </a:defRPr>
             </a:pPr>
             <a:r>
-              <a:t>Implement Figure Extraction</a:t>
+              <a:t>Integration of AI and Software Components</a:t>
             </a:r>
           </a:p>
         </p:txBody>
@@ -3516,6 +3623,42 @@
                 </a:solidFill>
               </a:defRPr>
             </a:pPr>
+          </a:p>
+          <a:p>
+            <a:pPr>
+              <a:defRPr>
+                <a:solidFill>
+                  <a:srgbClr val="000000"/>
+                </a:solidFill>
+              </a:defRPr>
+            </a:pPr>
+            <a:r>
+              <a:t>Integrate multiple AI components for presentations</a:t>
+            </a:r>
+          </a:p>
+          <a:p>
+            <a:pPr>
+              <a:defRPr>
+                <a:solidFill>
+                  <a:srgbClr val="000000"/>
+                </a:solidFill>
+              </a:defRPr>
+            </a:pPr>
+            <a:r>
+              <a:t>Project components: text extraction, figure extraction</a:t>
+            </a:r>
+          </a:p>
+          <a:p>
+            <a:pPr>
+              <a:defRPr>
+                <a:solidFill>
+                  <a:srgbClr val="000000"/>
+                </a:solidFill>
+              </a:defRPr>
+            </a:pPr>
+            <a:r>
+              <a:t>Automate insertion of newly generated figures</a:t>
+            </a:r>
           </a:p>
         </p:txBody>
       </p:sp>
@@ -3568,7 +3711,7 @@
               </a:defRPr>
             </a:pPr>
             <a:r>
-              <a:t>Generate New Figures</a:t>
+              <a:t>Slide Layout and Design Guidelines</a:t>
             </a:r>
           </a:p>
         </p:txBody>
@@ -3628,48 +3771,6 @@
               </a:defRPr>
             </a:pPr>
           </a:p>
-        </p:txBody>
-      </p:sp>
-    </p:spTree>
-  </p:cSld>
-  <p:clrMapOvr>
-    <a:masterClrMapping/>
-  </p:clrMapOvr>
-</p:sld>
-</file>
-
-<file path=ppt/slides/slide6.xml><?xml version="1.0" encoding="utf-8"?>
-<p:sld xmlns:a="http://schemas.openxmlformats.org/drawingml/2006/main" xmlns:p="http://schemas.openxmlformats.org/presentationml/2006/main" xmlns:r="http://schemas.openxmlformats.org/officeDocument/2006/relationships">
-  <p:cSld>
-    <p:bg>
-      <p:bgPr>
-        <a:solidFill>
-          <a:srgbClr val="FF5733"/>
-        </a:solidFill>
-        <a:effectLst/>
-      </p:bgPr>
-    </p:bg>
-    <p:spTree>
-      <p:nvGrpSpPr>
-        <p:cNvPr id="1" name=""/>
-        <p:cNvGrpSpPr/>
-        <p:nvPr/>
-      </p:nvGrpSpPr>
-      <p:grpSpPr/>
-      <p:sp>
-        <p:nvSpPr>
-          <p:cNvPr id="2" name="Title 1"/>
-          <p:cNvSpPr>
-            <a:spLocks noGrp="1"/>
-          </p:cNvSpPr>
-          <p:nvPr>
-            <p:ph type="title"/>
-          </p:nvPr>
-        </p:nvSpPr>
-        <p:spPr/>
-        <p:txBody>
-          <a:bodyPr/>
-          <a:lstStyle/>
           <a:p>
             <a:pPr>
               <a:defRPr>
@@ -3679,25 +3780,9 @@
               </a:defRPr>
             </a:pPr>
             <a:r>
-              <a:t>Ensure Design Consistency</a:t>
-            </a:r>
-          </a:p>
-        </p:txBody>
-      </p:sp>
-      <p:sp>
-        <p:nvSpPr>
-          <p:cNvPr id="3" name="Content Placeholder 2"/>
-          <p:cNvSpPr>
-            <a:spLocks noGrp="1"/>
-          </p:cNvSpPr>
-          <p:nvPr>
-            <p:ph idx="1"/>
-          </p:nvPr>
-        </p:nvSpPr>
-        <p:spPr/>
-        <p:txBody>
-          <a:bodyPr/>
-          <a:lstStyle/>
+              <a:t>Understand slide layout and design principles</a:t>
+            </a:r>
+          </a:p>
           <a:p>
             <a:pPr>
               <a:defRPr>
@@ -3706,30 +3791,10 @@
                 </a:solidFill>
               </a:defRPr>
             </a:pPr>
-          </a:p>
-        </p:txBody>
-      </p:sp>
-      <p:sp>
-        <p:nvSpPr>
-          <p:cNvPr id="4" name="TextBox 3"/>
-          <p:cNvSpPr txBox="1"/>
-          <p:nvPr/>
-        </p:nvSpPr>
-        <p:spPr>
-          <a:xfrm>
-            <a:off x="914400" y="1828800"/>
-            <a:ext cx="7315200" cy="3657600"/>
-          </a:xfrm>
-          <a:prstGeom prst="rect">
-            <a:avLst/>
-          </a:prstGeom>
-          <a:noFill/>
-        </p:spPr>
-        <p:txBody>
-          <a:bodyPr wrap="square">
-            <a:spAutoFit/>
-          </a:bodyPr>
-          <a:lstStyle/>
+            <a:r>
+              <a:t>Use heuristics for layout selection</a:t>
+            </a:r>
+          </a:p>
           <a:p>
             <a:pPr>
               <a:defRPr>
@@ -3738,53 +3803,8 @@
                 </a:solidFill>
               </a:defRPr>
             </a:pPr>
-          </a:p>
-          <a:p>
-            <a:pPr>
-              <a:defRPr>
-                <a:solidFill>
-                  <a:srgbClr val="000000"/>
-                </a:solidFill>
-              </a:defRPr>
-            </a:pPr>
-            <a:r>
-              <a:t>Enforce Color Theme</a:t>
-            </a:r>
-          </a:p>
-          <a:p>
-            <a:pPr>
-              <a:defRPr>
-                <a:solidFill>
-                  <a:srgbClr val="000000"/>
-                </a:solidFill>
-              </a:defRPr>
-            </a:pPr>
-            <a:r>
-              <a:t>Choose layout based on content</a:t>
-            </a:r>
-          </a:p>
-          <a:p>
-            <a:pPr>
-              <a:defRPr>
-                <a:solidFill>
-                  <a:srgbClr val="000000"/>
-                </a:solidFill>
-              </a:defRPr>
-            </a:pPr>
-            <a:r>
-              <a:t>Maintain styling &amp; formatting guidelines</a:t>
-            </a:r>
-          </a:p>
-          <a:p>
-            <a:pPr>
-              <a:defRPr>
-                <a:solidFill>
-                  <a:srgbClr val="000000"/>
-                </a:solidFill>
-              </a:defRPr>
-            </a:pPr>
-            <a:r>
-              <a:t>Incorporate branding and design standards</a:t>
+            <a:r>
+              <a:t>Incorporate institutional design guidelines</a:t>
             </a:r>
           </a:p>
         </p:txBody>

</xml_diff>

<commit_message>
update content and title size
</commit_message>
<xml_diff>
--- a/server/uploads/SmartSlideGen.pptx
+++ b/server/uploads/SmartSlideGen.pptx
@@ -9,7 +9,6 @@
     <p:sldId id="257" r:id="rId8"/>
     <p:sldId id="258" r:id="rId9"/>
     <p:sldId id="259" r:id="rId10"/>
-    <p:sldId id="260" r:id="rId11"/>
   </p:sldIdLst>
   <p:sldSz cx="9144000" cy="6858000" type="screen4x3"/>
   <p:notesSz cx="6858000" cy="9144000"/>
@@ -3094,7 +3093,7 @@
       <p:grpSpPr/>
       <p:pic>
         <p:nvPicPr>
-          <p:cNvPr id="5" name="Picture 4" descr="17.webp"/>
+          <p:cNvPr id="4" name="Picture 3" descr="17.webp"/>
           <p:cNvPicPr>
             <a:picLocks noChangeAspect="1"/>
           </p:cNvPicPr>
@@ -3138,40 +3137,12 @@
                 </a:solidFill>
               </a:defRPr>
             </a:pPr>
-            <a:r>
-              <a:t>AI-Driven Pipeline for Word to PowerPoint Conversion</a:t>
-            </a:r>
-          </a:p>
-        </p:txBody>
-      </p:sp>
-      <p:sp>
-        <p:nvSpPr>
-          <p:cNvPr id="3" name="Content Placeholder 2"/>
-          <p:cNvSpPr>
-            <a:spLocks noGrp="1"/>
-          </p:cNvSpPr>
-          <p:nvPr>
-            <p:ph idx="1"/>
-          </p:nvPr>
-        </p:nvSpPr>
-        <p:spPr/>
-        <p:txBody>
-          <a:bodyPr/>
-          <a:lstStyle/>
-          <a:p>
-            <a:pPr>
-              <a:defRPr>
-                <a:solidFill>
-                  <a:srgbClr val="000000"/>
-                </a:solidFill>
-              </a:defRPr>
-            </a:pPr>
-          </a:p>
-        </p:txBody>
-      </p:sp>
-      <p:sp>
-        <p:nvSpPr>
-          <p:cNvPr id="4" name="TextBox 3"/>
+          </a:p>
+        </p:txBody>
+      </p:sp>
+      <p:sp>
+        <p:nvSpPr>
+          <p:cNvPr id="3" name="TextBox 2"/>
           <p:cNvSpPr txBox="1"/>
           <p:nvPr/>
         </p:nvSpPr>
@@ -3208,31 +3179,10 @@
               </a:defRPr>
             </a:pPr>
             <a:r>
-              <a:t>Develop a pipeline using AI technology</a:t>
-            </a:r>
-          </a:p>
-          <a:p>
-            <a:pPr>
-              <a:defRPr>
-                <a:solidFill>
-                  <a:srgbClr val="000000"/>
-                </a:solidFill>
-              </a:defRPr>
-            </a:pPr>
-            <a:r>
-              <a:t>Parse and extract text content for initial slides</a:t>
-            </a:r>
-          </a:p>
-          <a:p>
-            <a:pPr>
-              <a:defRPr>
-                <a:solidFill>
-                  <a:srgbClr val="000000"/>
-                </a:solidFill>
-              </a:defRPr>
-            </a:pPr>
-            <a:r>
-              <a:t>Identify and extract relevant figures from the document</a:t>
+              <a:rPr sz="2808" b="0">
+                <a:latin typeface="Arial"/>
+              </a:rPr>
+              <a:t>...</a:t>
             </a:r>
           </a:p>
         </p:txBody>
@@ -3257,7 +3207,7 @@
       <p:grpSpPr/>
       <p:pic>
         <p:nvPicPr>
-          <p:cNvPr id="5" name="Picture 4" descr="17.webp"/>
+          <p:cNvPr id="4" name="Picture 3" descr="17.webp"/>
           <p:cNvPicPr>
             <a:picLocks noChangeAspect="1"/>
           </p:cNvPicPr>
@@ -3302,39 +3252,15 @@
               </a:defRPr>
             </a:pPr>
             <a:r>
-              <a:t>Generative AI Techniques for Visual Explanation</a:t>
-            </a:r>
-          </a:p>
-        </p:txBody>
-      </p:sp>
-      <p:sp>
-        <p:nvSpPr>
-          <p:cNvPr id="3" name="Content Placeholder 2"/>
-          <p:cNvSpPr>
-            <a:spLocks noGrp="1"/>
-          </p:cNvSpPr>
-          <p:nvPr>
-            <p:ph idx="1"/>
-          </p:nvPr>
-        </p:nvSpPr>
-        <p:spPr/>
-        <p:txBody>
-          <a:bodyPr/>
-          <a:lstStyle/>
-          <a:p>
-            <a:pPr>
-              <a:defRPr>
-                <a:solidFill>
-                  <a:srgbClr val="000000"/>
-                </a:solidFill>
-              </a:defRPr>
-            </a:pPr>
-          </a:p>
-        </p:txBody>
-      </p:sp>
-      <p:sp>
-        <p:nvSpPr>
-          <p:cNvPr id="4" name="TextBox 3"/>
+              <a:rPr sz="4032"/>
+              <a:t>...</a:t>
+            </a:r>
+          </a:p>
+        </p:txBody>
+      </p:sp>
+      <p:sp>
+        <p:nvSpPr>
+          <p:cNvPr id="3" name="TextBox 2"/>
           <p:cNvSpPr txBox="1"/>
           <p:nvPr/>
         </p:nvSpPr>
@@ -3371,31 +3297,10 @@
               </a:defRPr>
             </a:pPr>
             <a:r>
-              <a:t>Use generative AI to create new figures</a:t>
-            </a:r>
-          </a:p>
-          <a:p>
-            <a:pPr>
-              <a:defRPr>
-                <a:solidFill>
-                  <a:srgbClr val="000000"/>
-                </a:solidFill>
-              </a:defRPr>
-            </a:pPr>
-            <a:r>
-              <a:t>Apply coherent design or color theme for consistency</a:t>
-            </a:r>
-          </a:p>
-          <a:p>
-            <a:pPr>
-              <a:defRPr>
-                <a:solidFill>
-                  <a:srgbClr val="000000"/>
-                </a:solidFill>
-              </a:defRPr>
-            </a:pPr>
-            <a:r>
-              <a:t>Utilize generative AI for text-to-image or diagram generation</a:t>
+              <a:rPr sz="2808" b="0">
+                <a:latin typeface="Arial"/>
+              </a:rPr>
+              <a:t>...</a:t>
             </a:r>
           </a:p>
         </p:txBody>
@@ -3420,7 +3325,7 @@
       <p:grpSpPr/>
       <p:pic>
         <p:nvPicPr>
-          <p:cNvPr id="5" name="Picture 4" descr="17.webp"/>
+          <p:cNvPr id="4" name="Picture 3" descr="17.webp"/>
           <p:cNvPicPr>
             <a:picLocks noChangeAspect="1"/>
           </p:cNvPicPr>
@@ -3465,39 +3370,15 @@
               </a:defRPr>
             </a:pPr>
             <a:r>
-              <a:t>Integration of AI Components for Presentation Automation</a:t>
-            </a:r>
-          </a:p>
-        </p:txBody>
-      </p:sp>
-      <p:sp>
-        <p:nvSpPr>
-          <p:cNvPr id="3" name="Content Placeholder 2"/>
-          <p:cNvSpPr>
-            <a:spLocks noGrp="1"/>
-          </p:cNvSpPr>
-          <p:nvPr>
-            <p:ph idx="1"/>
-          </p:nvPr>
-        </p:nvSpPr>
-        <p:spPr/>
-        <p:txBody>
-          <a:bodyPr/>
-          <a:lstStyle/>
-          <a:p>
-            <a:pPr>
-              <a:defRPr>
-                <a:solidFill>
-                  <a:srgbClr val="000000"/>
-                </a:solidFill>
-              </a:defRPr>
-            </a:pPr>
-          </a:p>
-        </p:txBody>
-      </p:sp>
-      <p:sp>
-        <p:nvSpPr>
-          <p:cNvPr id="4" name="TextBox 3"/>
+              <a:rPr sz="4032"/>
+              <a:t>...</a:t>
+            </a:r>
+          </a:p>
+        </p:txBody>
+      </p:sp>
+      <p:sp>
+        <p:nvSpPr>
+          <p:cNvPr id="3" name="TextBox 2"/>
           <p:cNvSpPr txBox="1"/>
           <p:nvPr/>
         </p:nvSpPr>
@@ -3534,31 +3415,10 @@
               </a:defRPr>
             </a:pPr>
             <a:r>
-              <a:t>Combine multiple AI and software components</a:t>
-            </a:r>
-          </a:p>
-          <a:p>
-            <a:pPr>
-              <a:defRPr>
-                <a:solidFill>
-                  <a:srgbClr val="000000"/>
-                </a:solidFill>
-              </a:defRPr>
-            </a:pPr>
-            <a:r>
-              <a:t>Project tasks include text extraction, figure extraction, and slide-figure mapping</a:t>
-            </a:r>
-          </a:p>
-          <a:p>
-            <a:pPr>
-              <a:defRPr>
-                <a:solidFill>
-                  <a:srgbClr val="000000"/>
-                </a:solidFill>
-              </a:defRPr>
-            </a:pPr>
-            <a:r>
-              <a:t>Automate the insertion of newly generated figures onto slides</a:t>
+              <a:rPr sz="2808" b="0">
+                <a:latin typeface="Arial"/>
+              </a:rPr>
+              <a:t>...</a:t>
             </a:r>
           </a:p>
         </p:txBody>
@@ -3583,7 +3443,7 @@
       <p:grpSpPr/>
       <p:pic>
         <p:nvPicPr>
-          <p:cNvPr id="5" name="Picture 4" descr="17.webp"/>
+          <p:cNvPr id="4" name="Picture 3" descr="17.webp"/>
           <p:cNvPicPr>
             <a:picLocks noChangeAspect="1"/>
           </p:cNvPicPr>
@@ -3628,39 +3488,15 @@
               </a:defRPr>
             </a:pPr>
             <a:r>
-              <a:t>Consistency in Design and Layout</a:t>
-            </a:r>
-          </a:p>
-        </p:txBody>
-      </p:sp>
-      <p:sp>
-        <p:nvSpPr>
-          <p:cNvPr id="3" name="Content Placeholder 2"/>
-          <p:cNvSpPr>
-            <a:spLocks noGrp="1"/>
-          </p:cNvSpPr>
-          <p:nvPr>
-            <p:ph idx="1"/>
-          </p:nvPr>
-        </p:nvSpPr>
-        <p:spPr/>
-        <p:txBody>
-          <a:bodyPr/>
-          <a:lstStyle/>
-          <a:p>
-            <a:pPr>
-              <a:defRPr>
-                <a:solidFill>
-                  <a:srgbClr val="000000"/>
-                </a:solidFill>
-              </a:defRPr>
-            </a:pPr>
-          </a:p>
-        </p:txBody>
-      </p:sp>
-      <p:sp>
-        <p:nvSpPr>
-          <p:cNvPr id="4" name="TextBox 3"/>
+              <a:rPr sz="4032"/>
+              <a:t>...</a:t>
+            </a:r>
+          </a:p>
+        </p:txBody>
+      </p:sp>
+      <p:sp>
+        <p:nvSpPr>
+          <p:cNvPr id="3" name="TextBox 2"/>
           <p:cNvSpPr txBox="1"/>
           <p:nvPr/>
         </p:nvSpPr>
@@ -3697,194 +3533,10 @@
               </a:defRPr>
             </a:pPr>
             <a:r>
-              <a:t>Enforce color theme consistency in slide design</a:t>
-            </a:r>
-          </a:p>
-          <a:p>
-            <a:pPr>
-              <a:defRPr>
-                <a:solidFill>
-                  <a:srgbClr val="000000"/>
-                </a:solidFill>
-              </a:defRPr>
-            </a:pPr>
-            <a:r>
-              <a:t>Maintain consistency in font sizes for all elements</a:t>
-            </a:r>
-          </a:p>
-          <a:p>
-            <a:pPr>
-              <a:defRPr>
-                <a:solidFill>
-                  <a:srgbClr val="000000"/>
-                </a:solidFill>
-              </a:defRPr>
-            </a:pPr>
-            <a:r>
-              <a:t>Use heuristics or ML-based rules for layout decisions</a:t>
-            </a:r>
-          </a:p>
-        </p:txBody>
-      </p:sp>
-    </p:spTree>
-  </p:cSld>
-  <p:clrMapOvr>
-    <a:masterClrMapping/>
-  </p:clrMapOvr>
-</p:sld>
-</file>
-
-<file path=ppt/slides/slide5.xml><?xml version="1.0" encoding="utf-8"?>
-<p:sld xmlns:a="http://schemas.openxmlformats.org/drawingml/2006/main" xmlns:p="http://schemas.openxmlformats.org/presentationml/2006/main" xmlns:r="http://schemas.openxmlformats.org/officeDocument/2006/relationships">
-  <p:cSld>
-    <p:spTree>
-      <p:nvGrpSpPr>
-        <p:cNvPr id="1" name=""/>
-        <p:cNvGrpSpPr/>
-        <p:nvPr/>
-      </p:nvGrpSpPr>
-      <p:grpSpPr/>
-      <p:pic>
-        <p:nvPicPr>
-          <p:cNvPr id="5" name="Picture 4" descr="17.webp"/>
-          <p:cNvPicPr>
-            <a:picLocks noChangeAspect="1"/>
-          </p:cNvPicPr>
-          <p:nvPr/>
-        </p:nvPicPr>
-        <p:blipFill>
-          <a:blip r:embed="rId2"/>
-          <a:stretch>
-            <a:fillRect/>
-          </a:stretch>
-        </p:blipFill>
-        <p:spPr>
-          <a:xfrm>
-            <a:off x="0" y="0"/>
-            <a:ext cx="9144000" cy="6858000"/>
-          </a:xfrm>
-          <a:prstGeom prst="rect">
-            <a:avLst/>
-          </a:prstGeom>
-        </p:spPr>
-      </p:pic>
-      <p:sp>
-        <p:nvSpPr>
-          <p:cNvPr id="2" name="Title 1"/>
-          <p:cNvSpPr>
-            <a:spLocks noGrp="1"/>
-          </p:cNvSpPr>
-          <p:nvPr>
-            <p:ph type="title"/>
-          </p:nvPr>
-        </p:nvSpPr>
-        <p:spPr/>
-        <p:txBody>
-          <a:bodyPr/>
-          <a:lstStyle/>
-          <a:p>
-            <a:pPr>
-              <a:defRPr>
-                <a:solidFill>
-                  <a:srgbClr val="000000"/>
-                </a:solidFill>
-              </a:defRPr>
-            </a:pPr>
-            <a:r>
-              <a:t>Branding and Institutional Guidelines</a:t>
-            </a:r>
-          </a:p>
-        </p:txBody>
-      </p:sp>
-      <p:sp>
-        <p:nvSpPr>
-          <p:cNvPr id="3" name="Content Placeholder 2"/>
-          <p:cNvSpPr>
-            <a:spLocks noGrp="1"/>
-          </p:cNvSpPr>
-          <p:nvPr>
-            <p:ph idx="1"/>
-          </p:nvPr>
-        </p:nvSpPr>
-        <p:spPr/>
-        <p:txBody>
-          <a:bodyPr/>
-          <a:lstStyle/>
-          <a:p>
-            <a:pPr>
-              <a:defRPr>
-                <a:solidFill>
-                  <a:srgbClr val="000000"/>
-                </a:solidFill>
-              </a:defRPr>
-            </a:pPr>
-          </a:p>
-        </p:txBody>
-      </p:sp>
-      <p:sp>
-        <p:nvSpPr>
-          <p:cNvPr id="4" name="TextBox 3"/>
-          <p:cNvSpPr txBox="1"/>
-          <p:nvPr/>
-        </p:nvSpPr>
-        <p:spPr>
-          <a:xfrm>
-            <a:off x="914400" y="1828800"/>
-            <a:ext cx="7315200" cy="3657600"/>
-          </a:xfrm>
-          <a:prstGeom prst="rect">
-            <a:avLst/>
-          </a:prstGeom>
-          <a:noFill/>
-        </p:spPr>
-        <p:txBody>
-          <a:bodyPr wrap="square">
-            <a:spAutoFit/>
-          </a:bodyPr>
-          <a:lstStyle/>
-          <a:p>
-            <a:pPr>
-              <a:defRPr>
-                <a:solidFill>
-                  <a:srgbClr val="000000"/>
-                </a:solidFill>
-              </a:defRPr>
-            </a:pPr>
-          </a:p>
-          <a:p>
-            <a:pPr>
-              <a:defRPr>
-                <a:solidFill>
-                  <a:srgbClr val="000000"/>
-                </a:solidFill>
-              </a:defRPr>
-            </a:pPr>
-            <a:r>
-              <a:t>Incorporate course branding and design guidelines</a:t>
-            </a:r>
-          </a:p>
-          <a:p>
-            <a:pPr>
-              <a:defRPr>
-                <a:solidFill>
-                  <a:srgbClr val="000000"/>
-                </a:solidFill>
-              </a:defRPr>
-            </a:pPr>
-            <a:r>
-              <a:t>Ensure consistency in primary color palette and fonts</a:t>
-            </a:r>
-          </a:p>
-          <a:p>
-            <a:pPr>
-              <a:defRPr>
-                <a:solidFill>
-                  <a:srgbClr val="000000"/>
-                </a:solidFill>
-              </a:defRPr>
-            </a:pPr>
-            <a:r>
-              <a:t>Maintain consistency in styling and formatting across all slides</a:t>
+              <a:rPr sz="2808" b="0">
+                <a:latin typeface="Arial"/>
+              </a:rPr>
+              <a:t>...</a:t>
             </a:r>
           </a:p>
         </p:txBody>

</xml_diff>